<commit_message>
Rebuilt screen + Improved 2x2 Logger
</commit_message>
<xml_diff>
--- a/images/Whack a mole.pptx
+++ b/images/Whack a mole.pptx
@@ -5,11 +5,12 @@
     <p:sldMasterId id="2147483648" r:id="rId1"/>
   </p:sldMasterIdLst>
   <p:notesMasterIdLst>
-    <p:notesMasterId r:id="rId4"/>
+    <p:notesMasterId r:id="rId5"/>
   </p:notesMasterIdLst>
   <p:sldIdLst>
     <p:sldId id="256" r:id="rId2"/>
     <p:sldId id="257" r:id="rId3"/>
+    <p:sldId id="258" r:id="rId4"/>
   </p:sldIdLst>
   <p:sldSz cx="12192000" cy="6858000"/>
   <p:notesSz cx="6858000" cy="9144000"/>
@@ -198,7 +199,7 @@
           <a:p>
             <a:fld id="{F8124032-DB74-4B24-9D6C-0DB73E286C2C}" type="datetimeFigureOut">
               <a:rPr lang="en-GB" smtClean="0"/>
-              <a:t>11/02/2020</a:t>
+              <a:t>12/02/2020</a:t>
             </a:fld>
             <a:endParaRPr lang="en-GB"/>
           </a:p>
@@ -685,7 +686,7 @@
           <a:p>
             <a:fld id="{AD5A3EC8-63D0-49CB-ABB2-40C0A298F0AD}" type="datetimeFigureOut">
               <a:rPr lang="en-GB" smtClean="0"/>
-              <a:t>11/02/2020</a:t>
+              <a:t>12/02/2020</a:t>
             </a:fld>
             <a:endParaRPr lang="en-GB"/>
           </a:p>
@@ -855,7 +856,7 @@
           <a:p>
             <a:fld id="{AD5A3EC8-63D0-49CB-ABB2-40C0A298F0AD}" type="datetimeFigureOut">
               <a:rPr lang="en-GB" smtClean="0"/>
-              <a:t>11/02/2020</a:t>
+              <a:t>12/02/2020</a:t>
             </a:fld>
             <a:endParaRPr lang="en-GB"/>
           </a:p>
@@ -1035,7 +1036,7 @@
           <a:p>
             <a:fld id="{AD5A3EC8-63D0-49CB-ABB2-40C0A298F0AD}" type="datetimeFigureOut">
               <a:rPr lang="en-GB" smtClean="0"/>
-              <a:t>11/02/2020</a:t>
+              <a:t>12/02/2020</a:t>
             </a:fld>
             <a:endParaRPr lang="en-GB"/>
           </a:p>
@@ -1205,7 +1206,7 @@
           <a:p>
             <a:fld id="{AD5A3EC8-63D0-49CB-ABB2-40C0A298F0AD}" type="datetimeFigureOut">
               <a:rPr lang="en-GB" smtClean="0"/>
-              <a:t>11/02/2020</a:t>
+              <a:t>12/02/2020</a:t>
             </a:fld>
             <a:endParaRPr lang="en-GB"/>
           </a:p>
@@ -1451,7 +1452,7 @@
           <a:p>
             <a:fld id="{AD5A3EC8-63D0-49CB-ABB2-40C0A298F0AD}" type="datetimeFigureOut">
               <a:rPr lang="en-GB" smtClean="0"/>
-              <a:t>11/02/2020</a:t>
+              <a:t>12/02/2020</a:t>
             </a:fld>
             <a:endParaRPr lang="en-GB"/>
           </a:p>
@@ -1683,7 +1684,7 @@
           <a:p>
             <a:fld id="{AD5A3EC8-63D0-49CB-ABB2-40C0A298F0AD}" type="datetimeFigureOut">
               <a:rPr lang="en-GB" smtClean="0"/>
-              <a:t>11/02/2020</a:t>
+              <a:t>12/02/2020</a:t>
             </a:fld>
             <a:endParaRPr lang="en-GB"/>
           </a:p>
@@ -2050,7 +2051,7 @@
           <a:p>
             <a:fld id="{AD5A3EC8-63D0-49CB-ABB2-40C0A298F0AD}" type="datetimeFigureOut">
               <a:rPr lang="en-GB" smtClean="0"/>
-              <a:t>11/02/2020</a:t>
+              <a:t>12/02/2020</a:t>
             </a:fld>
             <a:endParaRPr lang="en-GB"/>
           </a:p>
@@ -2168,7 +2169,7 @@
           <a:p>
             <a:fld id="{AD5A3EC8-63D0-49CB-ABB2-40C0A298F0AD}" type="datetimeFigureOut">
               <a:rPr lang="en-GB" smtClean="0"/>
-              <a:t>11/02/2020</a:t>
+              <a:t>12/02/2020</a:t>
             </a:fld>
             <a:endParaRPr lang="en-GB"/>
           </a:p>
@@ -2263,7 +2264,7 @@
           <a:p>
             <a:fld id="{AD5A3EC8-63D0-49CB-ABB2-40C0A298F0AD}" type="datetimeFigureOut">
               <a:rPr lang="en-GB" smtClean="0"/>
-              <a:t>11/02/2020</a:t>
+              <a:t>12/02/2020</a:t>
             </a:fld>
             <a:endParaRPr lang="en-GB"/>
           </a:p>
@@ -2540,7 +2541,7 @@
           <a:p>
             <a:fld id="{AD5A3EC8-63D0-49CB-ABB2-40C0A298F0AD}" type="datetimeFigureOut">
               <a:rPr lang="en-GB" smtClean="0"/>
-              <a:t>11/02/2020</a:t>
+              <a:t>12/02/2020</a:t>
             </a:fld>
             <a:endParaRPr lang="en-GB"/>
           </a:p>
@@ -2793,7 +2794,7 @@
           <a:p>
             <a:fld id="{AD5A3EC8-63D0-49CB-ABB2-40C0A298F0AD}" type="datetimeFigureOut">
               <a:rPr lang="en-GB" smtClean="0"/>
-              <a:t>11/02/2020</a:t>
+              <a:t>12/02/2020</a:t>
             </a:fld>
             <a:endParaRPr lang="en-GB"/>
           </a:p>
@@ -3006,7 +3007,7 @@
           <a:p>
             <a:fld id="{AD5A3EC8-63D0-49CB-ABB2-40C0A298F0AD}" type="datetimeFigureOut">
               <a:rPr lang="en-GB" smtClean="0"/>
-              <a:t>11/02/2020</a:t>
+              <a:t>12/02/2020</a:t>
             </a:fld>
             <a:endParaRPr lang="en-GB"/>
           </a:p>
@@ -4339,6 +4340,64 @@
 </p:sld>
 </file>
 
+<file path=ppt/slides/slide3.xml><?xml version="1.0" encoding="utf-8"?>
+<p:sld xmlns:a="http://schemas.openxmlformats.org/drawingml/2006/main" xmlns:r="http://schemas.openxmlformats.org/officeDocument/2006/relationships" xmlns:p="http://schemas.openxmlformats.org/presentationml/2006/main">
+  <p:cSld>
+    <p:spTree>
+      <p:nvGrpSpPr>
+        <p:cNvPr id="1" name=""/>
+        <p:cNvGrpSpPr/>
+        <p:nvPr/>
+      </p:nvGrpSpPr>
+      <p:grpSpPr>
+        <a:xfrm>
+          <a:off x="0" y="0"/>
+          <a:ext cx="0" cy="0"/>
+          <a:chOff x="0" y="0"/>
+          <a:chExt cx="0" cy="0"/>
+        </a:xfrm>
+      </p:grpSpPr>
+      <p:pic>
+        <p:nvPicPr>
+          <p:cNvPr id="14" name="Picture 13"/>
+          <p:cNvPicPr>
+            <a:picLocks noChangeAspect="1"/>
+          </p:cNvPicPr>
+          <p:nvPr/>
+        </p:nvPicPr>
+        <p:blipFill rotWithShape="1">
+          <a:blip r:embed="rId2"/>
+          <a:srcRect r="589"/>
+          <a:stretch/>
+        </p:blipFill>
+        <p:spPr>
+          <a:xfrm>
+            <a:off x="1" y="-1"/>
+            <a:ext cx="9161928" cy="4244921"/>
+          </a:xfrm>
+          <a:prstGeom prst="rect">
+            <a:avLst/>
+          </a:prstGeom>
+          <a:ln>
+            <a:solidFill>
+              <a:schemeClr val="tx2"/>
+            </a:solidFill>
+          </a:ln>
+        </p:spPr>
+      </p:pic>
+    </p:spTree>
+    <p:extLst>
+      <p:ext uri="{BB962C8B-B14F-4D97-AF65-F5344CB8AC3E}">
+        <p14:creationId xmlns:p14="http://schemas.microsoft.com/office/powerpoint/2010/main" val="137541610"/>
+      </p:ext>
+    </p:extLst>
+  </p:cSld>
+  <p:clrMapOvr>
+    <a:masterClrMapping/>
+  </p:clrMapOvr>
+</p:sld>
+</file>
+
 <file path=ppt/theme/theme1.xml><?xml version="1.0" encoding="utf-8"?>
 <a:theme xmlns:a="http://schemas.openxmlformats.org/drawingml/2006/main" name="Office Theme">
   <a:themeElements>

</xml_diff>

<commit_message>
Merge of PyQT wrapper
</commit_message>
<xml_diff>
--- a/images/Whack a mole.pptx
+++ b/images/Whack a mole.pptx
@@ -5,7 +5,7 @@
     <p:sldMasterId id="2147483648" r:id="rId1"/>
   </p:sldMasterIdLst>
   <p:notesMasterIdLst>
-    <p:notesMasterId r:id="rId7"/>
+    <p:notesMasterId r:id="rId9"/>
   </p:notesMasterIdLst>
   <p:sldIdLst>
     <p:sldId id="256" r:id="rId2"/>
@@ -13,6 +13,8 @@
     <p:sldId id="260" r:id="rId4"/>
     <p:sldId id="259" r:id="rId5"/>
     <p:sldId id="258" r:id="rId6"/>
+    <p:sldId id="261" r:id="rId7"/>
+    <p:sldId id="262" r:id="rId8"/>
   </p:sldIdLst>
   <p:sldSz cx="12192000" cy="6858000"/>
   <p:notesSz cx="6858000" cy="9144000"/>
@@ -201,7 +203,7 @@
           <a:p>
             <a:fld id="{F8124032-DB74-4B24-9D6C-0DB73E286C2C}" type="datetimeFigureOut">
               <a:rPr lang="en-GB" smtClean="0"/>
-              <a:t>12/02/2020</a:t>
+              <a:t>16/02/2020</a:t>
             </a:fld>
             <a:endParaRPr lang="en-GB"/>
           </a:p>
@@ -645,6 +647,90 @@
 </p:notes>
 </file>
 
+<file path=ppt/notesSlides/notesSlide3.xml><?xml version="1.0" encoding="utf-8"?>
+<p:notes xmlns:a="http://schemas.openxmlformats.org/drawingml/2006/main" xmlns:r="http://schemas.openxmlformats.org/officeDocument/2006/relationships" xmlns:p="http://schemas.openxmlformats.org/presentationml/2006/main">
+  <p:cSld>
+    <p:spTree>
+      <p:nvGrpSpPr>
+        <p:cNvPr id="1" name=""/>
+        <p:cNvGrpSpPr/>
+        <p:nvPr/>
+      </p:nvGrpSpPr>
+      <p:grpSpPr>
+        <a:xfrm>
+          <a:off x="0" y="0"/>
+          <a:ext cx="0" cy="0"/>
+          <a:chOff x="0" y="0"/>
+          <a:chExt cx="0" cy="0"/>
+        </a:xfrm>
+      </p:grpSpPr>
+      <p:sp>
+        <p:nvSpPr>
+          <p:cNvPr id="2" name="Slide Image Placeholder 1"/>
+          <p:cNvSpPr>
+            <a:spLocks noGrp="1" noRot="1" noChangeAspect="1"/>
+          </p:cNvSpPr>
+          <p:nvPr>
+            <p:ph type="sldImg"/>
+          </p:nvPr>
+        </p:nvSpPr>
+        <p:spPr/>
+      </p:sp>
+      <p:sp>
+        <p:nvSpPr>
+          <p:cNvPr id="3" name="Notes Placeholder 2"/>
+          <p:cNvSpPr>
+            <a:spLocks noGrp="1"/>
+          </p:cNvSpPr>
+          <p:nvPr>
+            <p:ph type="body" idx="1"/>
+          </p:nvPr>
+        </p:nvSpPr>
+        <p:spPr/>
+        <p:txBody>
+          <a:bodyPr/>
+          <a:lstStyle/>
+          <a:p>
+            <a:endParaRPr lang="en-GB" dirty="0"/>
+          </a:p>
+        </p:txBody>
+      </p:sp>
+      <p:sp>
+        <p:nvSpPr>
+          <p:cNvPr id="4" name="Slide Number Placeholder 3"/>
+          <p:cNvSpPr>
+            <a:spLocks noGrp="1"/>
+          </p:cNvSpPr>
+          <p:nvPr>
+            <p:ph type="sldNum" sz="quarter" idx="10"/>
+          </p:nvPr>
+        </p:nvSpPr>
+        <p:spPr/>
+        <p:txBody>
+          <a:bodyPr/>
+          <a:lstStyle/>
+          <a:p>
+            <a:fld id="{13A7C749-0C7C-41A0-A350-DD69ADBF1AD8}" type="slidenum">
+              <a:rPr lang="en-GB" smtClean="0"/>
+              <a:t>6</a:t>
+            </a:fld>
+            <a:endParaRPr lang="en-GB"/>
+          </a:p>
+        </p:txBody>
+      </p:sp>
+    </p:spTree>
+    <p:extLst>
+      <p:ext uri="{BB962C8B-B14F-4D97-AF65-F5344CB8AC3E}">
+        <p14:creationId xmlns:p14="http://schemas.microsoft.com/office/powerpoint/2010/main" val="3943132826"/>
+      </p:ext>
+    </p:extLst>
+  </p:cSld>
+  <p:clrMapOvr>
+    <a:masterClrMapping/>
+  </p:clrMapOvr>
+</p:notes>
+</file>
+
 <file path=ppt/slideLayouts/slideLayout1.xml><?xml version="1.0" encoding="utf-8"?>
 <p:sldLayout xmlns:a="http://schemas.openxmlformats.org/drawingml/2006/main" xmlns:r="http://schemas.openxmlformats.org/officeDocument/2006/relationships" xmlns:p="http://schemas.openxmlformats.org/presentationml/2006/main" type="title" preserve="1">
   <p:cSld name="Title Slide">
@@ -776,7 +862,7 @@
           <a:p>
             <a:fld id="{AD5A3EC8-63D0-49CB-ABB2-40C0A298F0AD}" type="datetimeFigureOut">
               <a:rPr lang="en-GB" smtClean="0"/>
-              <a:t>12/02/2020</a:t>
+              <a:t>16/02/2020</a:t>
             </a:fld>
             <a:endParaRPr lang="en-GB"/>
           </a:p>
@@ -946,7 +1032,7 @@
           <a:p>
             <a:fld id="{AD5A3EC8-63D0-49CB-ABB2-40C0A298F0AD}" type="datetimeFigureOut">
               <a:rPr lang="en-GB" smtClean="0"/>
-              <a:t>12/02/2020</a:t>
+              <a:t>16/02/2020</a:t>
             </a:fld>
             <a:endParaRPr lang="en-GB"/>
           </a:p>
@@ -1126,7 +1212,7 @@
           <a:p>
             <a:fld id="{AD5A3EC8-63D0-49CB-ABB2-40C0A298F0AD}" type="datetimeFigureOut">
               <a:rPr lang="en-GB" smtClean="0"/>
-              <a:t>12/02/2020</a:t>
+              <a:t>16/02/2020</a:t>
             </a:fld>
             <a:endParaRPr lang="en-GB"/>
           </a:p>
@@ -1296,7 +1382,7 @@
           <a:p>
             <a:fld id="{AD5A3EC8-63D0-49CB-ABB2-40C0A298F0AD}" type="datetimeFigureOut">
               <a:rPr lang="en-GB" smtClean="0"/>
-              <a:t>12/02/2020</a:t>
+              <a:t>16/02/2020</a:t>
             </a:fld>
             <a:endParaRPr lang="en-GB"/>
           </a:p>
@@ -1542,7 +1628,7 @@
           <a:p>
             <a:fld id="{AD5A3EC8-63D0-49CB-ABB2-40C0A298F0AD}" type="datetimeFigureOut">
               <a:rPr lang="en-GB" smtClean="0"/>
-              <a:t>12/02/2020</a:t>
+              <a:t>16/02/2020</a:t>
             </a:fld>
             <a:endParaRPr lang="en-GB"/>
           </a:p>
@@ -1774,7 +1860,7 @@
           <a:p>
             <a:fld id="{AD5A3EC8-63D0-49CB-ABB2-40C0A298F0AD}" type="datetimeFigureOut">
               <a:rPr lang="en-GB" smtClean="0"/>
-              <a:t>12/02/2020</a:t>
+              <a:t>16/02/2020</a:t>
             </a:fld>
             <a:endParaRPr lang="en-GB"/>
           </a:p>
@@ -2141,7 +2227,7 @@
           <a:p>
             <a:fld id="{AD5A3EC8-63D0-49CB-ABB2-40C0A298F0AD}" type="datetimeFigureOut">
               <a:rPr lang="en-GB" smtClean="0"/>
-              <a:t>12/02/2020</a:t>
+              <a:t>16/02/2020</a:t>
             </a:fld>
             <a:endParaRPr lang="en-GB"/>
           </a:p>
@@ -2259,7 +2345,7 @@
           <a:p>
             <a:fld id="{AD5A3EC8-63D0-49CB-ABB2-40C0A298F0AD}" type="datetimeFigureOut">
               <a:rPr lang="en-GB" smtClean="0"/>
-              <a:t>12/02/2020</a:t>
+              <a:t>16/02/2020</a:t>
             </a:fld>
             <a:endParaRPr lang="en-GB"/>
           </a:p>
@@ -2354,7 +2440,7 @@
           <a:p>
             <a:fld id="{AD5A3EC8-63D0-49CB-ABB2-40C0A298F0AD}" type="datetimeFigureOut">
               <a:rPr lang="en-GB" smtClean="0"/>
-              <a:t>12/02/2020</a:t>
+              <a:t>16/02/2020</a:t>
             </a:fld>
             <a:endParaRPr lang="en-GB"/>
           </a:p>
@@ -2631,7 +2717,7 @@
           <a:p>
             <a:fld id="{AD5A3EC8-63D0-49CB-ABB2-40C0A298F0AD}" type="datetimeFigureOut">
               <a:rPr lang="en-GB" smtClean="0"/>
-              <a:t>12/02/2020</a:t>
+              <a:t>16/02/2020</a:t>
             </a:fld>
             <a:endParaRPr lang="en-GB"/>
           </a:p>
@@ -2884,7 +2970,7 @@
           <a:p>
             <a:fld id="{AD5A3EC8-63D0-49CB-ABB2-40C0A298F0AD}" type="datetimeFigureOut">
               <a:rPr lang="en-GB" smtClean="0"/>
-              <a:t>12/02/2020</a:t>
+              <a:t>16/02/2020</a:t>
             </a:fld>
             <a:endParaRPr lang="en-GB"/>
           </a:p>
@@ -3097,7 +3183,7 @@
           <a:p>
             <a:fld id="{AD5A3EC8-63D0-49CB-ABB2-40C0A298F0AD}" type="datetimeFigureOut">
               <a:rPr lang="en-GB" smtClean="0"/>
-              <a:t>12/02/2020</a:t>
+              <a:t>16/02/2020</a:t>
             </a:fld>
             <a:endParaRPr lang="en-GB"/>
           </a:p>
@@ -4837,13 +4923,7 @@
               <a:rPr lang="en-GB" sz="2000" dirty="0" err="1" smtClean="0">
                 <a:latin typeface="Brush King" panose="02000600000000000000" pitchFamily="50" charset="0"/>
               </a:rPr>
-              <a:t>playin</a:t>
-            </a:r>
-            <a:r>
-              <a:rPr lang="en-GB" sz="2000" dirty="0" err="1" smtClean="0">
-                <a:latin typeface="Brush King" panose="02000600000000000000" pitchFamily="50" charset="0"/>
-              </a:rPr>
-              <a:t>G</a:t>
+              <a:t>playinG</a:t>
             </a:r>
             <a:endParaRPr lang="en-GB" sz="2000" dirty="0" smtClean="0">
               <a:latin typeface="Brush King" panose="02000600000000000000" pitchFamily="50" charset="0"/>
@@ -4932,19 +5012,7 @@
               <a:rPr lang="en-GB" sz="1050" dirty="0" smtClean="0">
                 <a:latin typeface="Brush King" panose="02000600000000000000" pitchFamily="50" charset="0"/>
               </a:rPr>
-              <a:t>brought </a:t>
-            </a:r>
-            <a:r>
-              <a:rPr lang="en-GB" sz="1050" dirty="0" smtClean="0">
-                <a:latin typeface="Brush King" panose="02000600000000000000" pitchFamily="50" charset="0"/>
-              </a:rPr>
-              <a:t>to you by the BDM </a:t>
-            </a:r>
-            <a:r>
-              <a:rPr lang="en-GB" sz="1050" dirty="0" smtClean="0">
-                <a:latin typeface="Brush King" panose="02000600000000000000" pitchFamily="50" charset="0"/>
-              </a:rPr>
-              <a:t>lab</a:t>
+              <a:t>brought to you by the BDM lab</a:t>
             </a:r>
             <a:endParaRPr lang="en-GB" sz="1050" dirty="0">
               <a:latin typeface="Brush King" panose="02000600000000000000" pitchFamily="50" charset="0"/>
@@ -5166,6 +5234,777 @@
     <p:extLst>
       <p:ext uri="{BB962C8B-B14F-4D97-AF65-F5344CB8AC3E}">
         <p14:creationId xmlns:p14="http://schemas.microsoft.com/office/powerpoint/2010/main" val="137541610"/>
+      </p:ext>
+    </p:extLst>
+  </p:cSld>
+  <p:clrMapOvr>
+    <a:masterClrMapping/>
+  </p:clrMapOvr>
+</p:sld>
+</file>
+
+<file path=ppt/slides/slide6.xml><?xml version="1.0" encoding="utf-8"?>
+<p:sld xmlns:a="http://schemas.openxmlformats.org/drawingml/2006/main" xmlns:r="http://schemas.openxmlformats.org/officeDocument/2006/relationships" xmlns:p="http://schemas.openxmlformats.org/presentationml/2006/main">
+  <p:cSld>
+    <p:spTree>
+      <p:nvGrpSpPr>
+        <p:cNvPr id="1" name=""/>
+        <p:cNvGrpSpPr/>
+        <p:nvPr/>
+      </p:nvGrpSpPr>
+      <p:grpSpPr>
+        <a:xfrm>
+          <a:off x="0" y="0"/>
+          <a:ext cx="0" cy="0"/>
+          <a:chOff x="0" y="0"/>
+          <a:chExt cx="0" cy="0"/>
+        </a:xfrm>
+      </p:grpSpPr>
+      <p:pic>
+        <p:nvPicPr>
+          <p:cNvPr id="4" name="Picture 3"/>
+          <p:cNvPicPr>
+            <a:picLocks noChangeAspect="1"/>
+          </p:cNvPicPr>
+          <p:nvPr/>
+        </p:nvPicPr>
+        <p:blipFill>
+          <a:blip r:embed="rId3">
+            <a:extLst>
+              <a:ext uri="{28A0092B-C50C-407E-A947-70E740481C1C}">
+                <a14:useLocalDpi xmlns:a14="http://schemas.microsoft.com/office/drawing/2010/main" val="0"/>
+              </a:ext>
+            </a:extLst>
+          </a:blip>
+          <a:stretch>
+            <a:fillRect/>
+          </a:stretch>
+        </p:blipFill>
+        <p:spPr>
+          <a:xfrm>
+            <a:off x="0" y="813732"/>
+            <a:ext cx="12192000" cy="5230535"/>
+          </a:xfrm>
+          <a:prstGeom prst="rect">
+            <a:avLst/>
+          </a:prstGeom>
+        </p:spPr>
+      </p:pic>
+      <p:sp>
+        <p:nvSpPr>
+          <p:cNvPr id="5" name="Title 1"/>
+          <p:cNvSpPr txBox="1">
+            <a:spLocks/>
+          </p:cNvSpPr>
+          <p:nvPr/>
+        </p:nvSpPr>
+        <p:spPr>
+          <a:xfrm>
+            <a:off x="0" y="89648"/>
+            <a:ext cx="12192000" cy="5954620"/>
+          </a:xfrm>
+          <a:prstGeom prst="rect">
+            <a:avLst/>
+          </a:prstGeom>
+          <a:solidFill>
+            <a:schemeClr val="bg1"/>
+          </a:solidFill>
+        </p:spPr>
+        <p:txBody>
+          <a:bodyPr vert="horz" lIns="91440" tIns="45720" rIns="91440" bIns="45720" rtlCol="0" anchor="ctr">
+            <a:normAutofit/>
+          </a:bodyPr>
+          <a:lstStyle>
+            <a:lvl1pPr algn="l" defTabSz="914400" rtl="0" eaLnBrk="1" latinLnBrk="0" hangingPunct="1">
+              <a:lnSpc>
+                <a:spcPct val="90000"/>
+              </a:lnSpc>
+              <a:spcBef>
+                <a:spcPct val="0"/>
+              </a:spcBef>
+              <a:buNone/>
+              <a:defRPr sz="4400" kern="1200">
+                <a:solidFill>
+                  <a:schemeClr val="tx1"/>
+                </a:solidFill>
+                <a:latin typeface="+mj-lt"/>
+                <a:ea typeface="+mj-ea"/>
+                <a:cs typeface="+mj-cs"/>
+              </a:defRPr>
+            </a:lvl1pPr>
+          </a:lstStyle>
+          <a:p>
+            <a:pPr algn="ctr"/>
+            <a:r>
+              <a:rPr lang="en-GB" sz="8000" dirty="0" smtClean="0">
+                <a:solidFill>
+                  <a:schemeClr val="accent5"/>
+                </a:solidFill>
+                <a:latin typeface="Brush King" panose="02000600000000000000" pitchFamily="50" charset="0"/>
+              </a:rPr>
+              <a:t>Whack a mole</a:t>
+            </a:r>
+          </a:p>
+          <a:p>
+            <a:pPr algn="ctr"/>
+            <a:endParaRPr lang="en-GB" sz="8000" dirty="0">
+              <a:solidFill>
+                <a:schemeClr val="accent5"/>
+              </a:solidFill>
+              <a:latin typeface="Brush King" panose="02000600000000000000" pitchFamily="50" charset="0"/>
+            </a:endParaRPr>
+          </a:p>
+        </p:txBody>
+      </p:sp>
+      <p:pic>
+        <p:nvPicPr>
+          <p:cNvPr id="6" name="Picture 5"/>
+          <p:cNvPicPr>
+            <a:picLocks noChangeAspect="1"/>
+          </p:cNvPicPr>
+          <p:nvPr/>
+        </p:nvPicPr>
+        <p:blipFill rotWithShape="1">
+          <a:blip r:embed="rId4"/>
+          <a:srcRect t="48586"/>
+          <a:stretch/>
+        </p:blipFill>
+        <p:spPr>
+          <a:xfrm>
+            <a:off x="6606988" y="5084762"/>
+            <a:ext cx="5585012" cy="959506"/>
+          </a:xfrm>
+          <a:prstGeom prst="rect">
+            <a:avLst/>
+          </a:prstGeom>
+        </p:spPr>
+      </p:pic>
+      <p:pic>
+        <p:nvPicPr>
+          <p:cNvPr id="7" name="Picture 6"/>
+          <p:cNvPicPr>
+            <a:picLocks noChangeAspect="1"/>
+          </p:cNvPicPr>
+          <p:nvPr/>
+        </p:nvPicPr>
+        <p:blipFill rotWithShape="1">
+          <a:blip r:embed="rId4"/>
+          <a:srcRect t="48586" r="53980"/>
+          <a:stretch/>
+        </p:blipFill>
+        <p:spPr>
+          <a:xfrm>
+            <a:off x="0" y="5084762"/>
+            <a:ext cx="6893859" cy="959506"/>
+          </a:xfrm>
+          <a:prstGeom prst="rect">
+            <a:avLst/>
+          </a:prstGeom>
+        </p:spPr>
+      </p:pic>
+      <p:sp>
+        <p:nvSpPr>
+          <p:cNvPr id="8" name="Subtitle 2"/>
+          <p:cNvSpPr txBox="1">
+            <a:spLocks/>
+          </p:cNvSpPr>
+          <p:nvPr/>
+        </p:nvSpPr>
+        <p:spPr>
+          <a:xfrm>
+            <a:off x="1524000" y="4240306"/>
+            <a:ext cx="9144000" cy="602408"/>
+          </a:xfrm>
+          <a:prstGeom prst="rect">
+            <a:avLst/>
+          </a:prstGeom>
+        </p:spPr>
+        <p:txBody>
+          <a:bodyPr vert="horz" lIns="91440" tIns="45720" rIns="91440" bIns="45720" rtlCol="0">
+            <a:normAutofit/>
+          </a:bodyPr>
+          <a:lstStyle>
+            <a:lvl1pPr marL="0" indent="0" algn="ctr" defTabSz="914400" rtl="0" eaLnBrk="1" latinLnBrk="0" hangingPunct="1">
+              <a:lnSpc>
+                <a:spcPct val="90000"/>
+              </a:lnSpc>
+              <a:spcBef>
+                <a:spcPts val="1000"/>
+              </a:spcBef>
+              <a:buFont typeface="Arial" panose="020B0604020202020204" pitchFamily="34" charset="0"/>
+              <a:buNone/>
+              <a:defRPr sz="2400" kern="1200">
+                <a:solidFill>
+                  <a:schemeClr val="tx1"/>
+                </a:solidFill>
+                <a:latin typeface="+mn-lt"/>
+                <a:ea typeface="+mn-ea"/>
+                <a:cs typeface="+mn-cs"/>
+              </a:defRPr>
+            </a:lvl1pPr>
+            <a:lvl2pPr marL="457200" indent="0" algn="ctr" defTabSz="914400" rtl="0" eaLnBrk="1" latinLnBrk="0" hangingPunct="1">
+              <a:lnSpc>
+                <a:spcPct val="90000"/>
+              </a:lnSpc>
+              <a:spcBef>
+                <a:spcPts val="500"/>
+              </a:spcBef>
+              <a:buFont typeface="Arial" panose="020B0604020202020204" pitchFamily="34" charset="0"/>
+              <a:buNone/>
+              <a:defRPr sz="2000" kern="1200">
+                <a:solidFill>
+                  <a:schemeClr val="tx1"/>
+                </a:solidFill>
+                <a:latin typeface="+mn-lt"/>
+                <a:ea typeface="+mn-ea"/>
+                <a:cs typeface="+mn-cs"/>
+              </a:defRPr>
+            </a:lvl2pPr>
+            <a:lvl3pPr marL="914400" indent="0" algn="ctr" defTabSz="914400" rtl="0" eaLnBrk="1" latinLnBrk="0" hangingPunct="1">
+              <a:lnSpc>
+                <a:spcPct val="90000"/>
+              </a:lnSpc>
+              <a:spcBef>
+                <a:spcPts val="500"/>
+              </a:spcBef>
+              <a:buFont typeface="Arial" panose="020B0604020202020204" pitchFamily="34" charset="0"/>
+              <a:buNone/>
+              <a:defRPr sz="1800" kern="1200">
+                <a:solidFill>
+                  <a:schemeClr val="tx1"/>
+                </a:solidFill>
+                <a:latin typeface="+mn-lt"/>
+                <a:ea typeface="+mn-ea"/>
+                <a:cs typeface="+mn-cs"/>
+              </a:defRPr>
+            </a:lvl3pPr>
+            <a:lvl4pPr marL="1371600" indent="0" algn="ctr" defTabSz="914400" rtl="0" eaLnBrk="1" latinLnBrk="0" hangingPunct="1">
+              <a:lnSpc>
+                <a:spcPct val="90000"/>
+              </a:lnSpc>
+              <a:spcBef>
+                <a:spcPts val="500"/>
+              </a:spcBef>
+              <a:buFont typeface="Arial" panose="020B0604020202020204" pitchFamily="34" charset="0"/>
+              <a:buNone/>
+              <a:defRPr sz="1600" kern="1200">
+                <a:solidFill>
+                  <a:schemeClr val="tx1"/>
+                </a:solidFill>
+                <a:latin typeface="+mn-lt"/>
+                <a:ea typeface="+mn-ea"/>
+                <a:cs typeface="+mn-cs"/>
+              </a:defRPr>
+            </a:lvl4pPr>
+            <a:lvl5pPr marL="1828800" indent="0" algn="ctr" defTabSz="914400" rtl="0" eaLnBrk="1" latinLnBrk="0" hangingPunct="1">
+              <a:lnSpc>
+                <a:spcPct val="90000"/>
+              </a:lnSpc>
+              <a:spcBef>
+                <a:spcPts val="500"/>
+              </a:spcBef>
+              <a:buFont typeface="Arial" panose="020B0604020202020204" pitchFamily="34" charset="0"/>
+              <a:buNone/>
+              <a:defRPr sz="1600" kern="1200">
+                <a:solidFill>
+                  <a:schemeClr val="tx1"/>
+                </a:solidFill>
+                <a:latin typeface="+mn-lt"/>
+                <a:ea typeface="+mn-ea"/>
+                <a:cs typeface="+mn-cs"/>
+              </a:defRPr>
+            </a:lvl5pPr>
+            <a:lvl6pPr marL="2286000" indent="0" algn="ctr" defTabSz="914400" rtl="0" eaLnBrk="1" latinLnBrk="0" hangingPunct="1">
+              <a:lnSpc>
+                <a:spcPct val="90000"/>
+              </a:lnSpc>
+              <a:spcBef>
+                <a:spcPts val="500"/>
+              </a:spcBef>
+              <a:buFont typeface="Arial" panose="020B0604020202020204" pitchFamily="34" charset="0"/>
+              <a:buNone/>
+              <a:defRPr sz="1600" kern="1200">
+                <a:solidFill>
+                  <a:schemeClr val="tx1"/>
+                </a:solidFill>
+                <a:latin typeface="+mn-lt"/>
+                <a:ea typeface="+mn-ea"/>
+                <a:cs typeface="+mn-cs"/>
+              </a:defRPr>
+            </a:lvl6pPr>
+            <a:lvl7pPr marL="2743200" indent="0" algn="ctr" defTabSz="914400" rtl="0" eaLnBrk="1" latinLnBrk="0" hangingPunct="1">
+              <a:lnSpc>
+                <a:spcPct val="90000"/>
+              </a:lnSpc>
+              <a:spcBef>
+                <a:spcPts val="500"/>
+              </a:spcBef>
+              <a:buFont typeface="Arial" panose="020B0604020202020204" pitchFamily="34" charset="0"/>
+              <a:buNone/>
+              <a:defRPr sz="1600" kern="1200">
+                <a:solidFill>
+                  <a:schemeClr val="tx1"/>
+                </a:solidFill>
+                <a:latin typeface="+mn-lt"/>
+                <a:ea typeface="+mn-ea"/>
+                <a:cs typeface="+mn-cs"/>
+              </a:defRPr>
+            </a:lvl7pPr>
+            <a:lvl8pPr marL="3200400" indent="0" algn="ctr" defTabSz="914400" rtl="0" eaLnBrk="1" latinLnBrk="0" hangingPunct="1">
+              <a:lnSpc>
+                <a:spcPct val="90000"/>
+              </a:lnSpc>
+              <a:spcBef>
+                <a:spcPts val="500"/>
+              </a:spcBef>
+              <a:buFont typeface="Arial" panose="020B0604020202020204" pitchFamily="34" charset="0"/>
+              <a:buNone/>
+              <a:defRPr sz="1600" kern="1200">
+                <a:solidFill>
+                  <a:schemeClr val="tx1"/>
+                </a:solidFill>
+                <a:latin typeface="+mn-lt"/>
+                <a:ea typeface="+mn-ea"/>
+                <a:cs typeface="+mn-cs"/>
+              </a:defRPr>
+            </a:lvl8pPr>
+            <a:lvl9pPr marL="3657600" indent="0" algn="ctr" defTabSz="914400" rtl="0" eaLnBrk="1" latinLnBrk="0" hangingPunct="1">
+              <a:lnSpc>
+                <a:spcPct val="90000"/>
+              </a:lnSpc>
+              <a:spcBef>
+                <a:spcPts val="500"/>
+              </a:spcBef>
+              <a:buFont typeface="Arial" panose="020B0604020202020204" pitchFamily="34" charset="0"/>
+              <a:buNone/>
+              <a:defRPr sz="1600" kern="1200">
+                <a:solidFill>
+                  <a:schemeClr val="tx1"/>
+                </a:solidFill>
+                <a:latin typeface="+mn-lt"/>
+                <a:ea typeface="+mn-ea"/>
+                <a:cs typeface="+mn-cs"/>
+              </a:defRPr>
+            </a:lvl9pPr>
+          </a:lstStyle>
+          <a:p>
+            <a:endParaRPr lang="en-GB" sz="1400" dirty="0" smtClean="0">
+              <a:latin typeface="Brush King" panose="02000600000000000000" pitchFamily="50" charset="0"/>
+            </a:endParaRPr>
+          </a:p>
+          <a:p>
+            <a:r>
+              <a:rPr lang="en-GB" sz="1050" dirty="0" smtClean="0">
+                <a:latin typeface="Brush King" panose="02000600000000000000" pitchFamily="50" charset="0"/>
+              </a:rPr>
+              <a:t>brought </a:t>
+            </a:r>
+            <a:r>
+              <a:rPr lang="en-GB" sz="1050" dirty="0" smtClean="0">
+                <a:latin typeface="Brush King" panose="02000600000000000000" pitchFamily="50" charset="0"/>
+              </a:rPr>
+              <a:t>to you by the BDM lab</a:t>
+            </a:r>
+            <a:endParaRPr lang="en-GB" sz="1050" dirty="0">
+              <a:latin typeface="Brush King" panose="02000600000000000000" pitchFamily="50" charset="0"/>
+            </a:endParaRPr>
+          </a:p>
+        </p:txBody>
+      </p:sp>
+    </p:spTree>
+    <p:extLst>
+      <p:ext uri="{BB962C8B-B14F-4D97-AF65-F5344CB8AC3E}">
+        <p14:creationId xmlns:p14="http://schemas.microsoft.com/office/powerpoint/2010/main" val="1243445766"/>
+      </p:ext>
+    </p:extLst>
+  </p:cSld>
+  <p:clrMapOvr>
+    <a:masterClrMapping/>
+  </p:clrMapOvr>
+</p:sld>
+</file>
+
+<file path=ppt/slides/slide7.xml><?xml version="1.0" encoding="utf-8"?>
+<p:sld xmlns:a="http://schemas.openxmlformats.org/drawingml/2006/main" xmlns:r="http://schemas.openxmlformats.org/officeDocument/2006/relationships" xmlns:p="http://schemas.openxmlformats.org/presentationml/2006/main">
+  <p:cSld>
+    <p:spTree>
+      <p:nvGrpSpPr>
+        <p:cNvPr id="1" name=""/>
+        <p:cNvGrpSpPr/>
+        <p:nvPr/>
+      </p:nvGrpSpPr>
+      <p:grpSpPr>
+        <a:xfrm>
+          <a:off x="0" y="0"/>
+          <a:ext cx="0" cy="0"/>
+          <a:chOff x="0" y="0"/>
+          <a:chExt cx="0" cy="0"/>
+        </a:xfrm>
+      </p:grpSpPr>
+      <p:pic>
+        <p:nvPicPr>
+          <p:cNvPr id="4" name="Picture 3"/>
+          <p:cNvPicPr>
+            <a:picLocks noChangeAspect="1"/>
+          </p:cNvPicPr>
+          <p:nvPr/>
+        </p:nvPicPr>
+        <p:blipFill rotWithShape="1">
+          <a:blip r:embed="rId2"/>
+          <a:srcRect l="16026" t="12792" r="27564" b="31823"/>
+          <a:stretch/>
+        </p:blipFill>
+        <p:spPr>
+          <a:xfrm>
+            <a:off x="656491" y="609600"/>
+            <a:ext cx="10316309" cy="5697416"/>
+          </a:xfrm>
+          <a:prstGeom prst="rect">
+            <a:avLst/>
+          </a:prstGeom>
+        </p:spPr>
+      </p:pic>
+      <p:sp>
+        <p:nvSpPr>
+          <p:cNvPr id="6" name="Title 1"/>
+          <p:cNvSpPr txBox="1">
+            <a:spLocks/>
+          </p:cNvSpPr>
+          <p:nvPr/>
+        </p:nvSpPr>
+        <p:spPr>
+          <a:xfrm>
+            <a:off x="656491" y="609600"/>
+            <a:ext cx="10316309" cy="5954619"/>
+          </a:xfrm>
+          <a:prstGeom prst="rect">
+            <a:avLst/>
+          </a:prstGeom>
+          <a:solidFill>
+            <a:schemeClr val="bg1"/>
+          </a:solidFill>
+        </p:spPr>
+        <p:txBody>
+          <a:bodyPr vert="horz" lIns="91440" tIns="45720" rIns="91440" bIns="45720" rtlCol="0" anchor="ctr">
+            <a:normAutofit/>
+          </a:bodyPr>
+          <a:lstStyle>
+            <a:lvl1pPr algn="l" defTabSz="914400" rtl="0" eaLnBrk="1" latinLnBrk="0" hangingPunct="1">
+              <a:lnSpc>
+                <a:spcPct val="90000"/>
+              </a:lnSpc>
+              <a:spcBef>
+                <a:spcPct val="0"/>
+              </a:spcBef>
+              <a:buNone/>
+              <a:defRPr sz="4400" kern="1200">
+                <a:solidFill>
+                  <a:schemeClr val="tx1"/>
+                </a:solidFill>
+                <a:latin typeface="+mj-lt"/>
+                <a:ea typeface="+mj-ea"/>
+                <a:cs typeface="+mj-cs"/>
+              </a:defRPr>
+            </a:lvl1pPr>
+          </a:lstStyle>
+          <a:p>
+            <a:pPr algn="ctr"/>
+            <a:r>
+              <a:rPr lang="en-GB" sz="6600" dirty="0" smtClean="0">
+                <a:solidFill>
+                  <a:schemeClr val="accent5"/>
+                </a:solidFill>
+                <a:latin typeface="Brush King" panose="02000600000000000000" pitchFamily="50" charset="0"/>
+              </a:rPr>
+              <a:t>Whack a mole</a:t>
+            </a:r>
+          </a:p>
+          <a:p>
+            <a:pPr algn="ctr"/>
+            <a:endParaRPr lang="en-GB" sz="6600" dirty="0">
+              <a:solidFill>
+                <a:schemeClr val="accent5"/>
+              </a:solidFill>
+              <a:latin typeface="Brush King" panose="02000600000000000000" pitchFamily="50" charset="0"/>
+            </a:endParaRPr>
+          </a:p>
+        </p:txBody>
+      </p:sp>
+      <p:pic>
+        <p:nvPicPr>
+          <p:cNvPr id="7" name="Picture 6"/>
+          <p:cNvPicPr>
+            <a:picLocks noChangeAspect="1"/>
+          </p:cNvPicPr>
+          <p:nvPr/>
+        </p:nvPicPr>
+        <p:blipFill rotWithShape="1">
+          <a:blip r:embed="rId3">
+            <a:duotone>
+              <a:schemeClr val="accent3">
+                <a:shade val="45000"/>
+                <a:satMod val="135000"/>
+              </a:schemeClr>
+              <a:prstClr val="white"/>
+            </a:duotone>
+          </a:blip>
+          <a:srcRect t="48586"/>
+          <a:stretch/>
+        </p:blipFill>
+        <p:spPr>
+          <a:xfrm>
+            <a:off x="7802880" y="6067188"/>
+            <a:ext cx="3169920" cy="497031"/>
+          </a:xfrm>
+          <a:prstGeom prst="rect">
+            <a:avLst/>
+          </a:prstGeom>
+        </p:spPr>
+      </p:pic>
+      <p:pic>
+        <p:nvPicPr>
+          <p:cNvPr id="8" name="Picture 7"/>
+          <p:cNvPicPr>
+            <a:picLocks noChangeAspect="1"/>
+          </p:cNvPicPr>
+          <p:nvPr/>
+        </p:nvPicPr>
+        <p:blipFill rotWithShape="1">
+          <a:blip r:embed="rId3">
+            <a:duotone>
+              <a:schemeClr val="accent3">
+                <a:shade val="45000"/>
+                <a:satMod val="135000"/>
+              </a:schemeClr>
+              <a:prstClr val="white"/>
+            </a:duotone>
+          </a:blip>
+          <a:srcRect t="48586" r="53980"/>
+          <a:stretch/>
+        </p:blipFill>
+        <p:spPr>
+          <a:xfrm>
+            <a:off x="656492" y="6067188"/>
+            <a:ext cx="7705188" cy="497032"/>
+          </a:xfrm>
+          <a:prstGeom prst="rect">
+            <a:avLst/>
+          </a:prstGeom>
+        </p:spPr>
+      </p:pic>
+      <p:sp>
+        <p:nvSpPr>
+          <p:cNvPr id="9" name="Subtitle 2"/>
+          <p:cNvSpPr txBox="1">
+            <a:spLocks/>
+          </p:cNvSpPr>
+          <p:nvPr/>
+        </p:nvSpPr>
+        <p:spPr>
+          <a:xfrm>
+            <a:off x="2180491" y="5308898"/>
+            <a:ext cx="7737232" cy="602408"/>
+          </a:xfrm>
+          <a:prstGeom prst="rect">
+            <a:avLst/>
+          </a:prstGeom>
+        </p:spPr>
+        <p:txBody>
+          <a:bodyPr vert="horz" lIns="91440" tIns="45720" rIns="91440" bIns="45720" rtlCol="0">
+            <a:normAutofit/>
+          </a:bodyPr>
+          <a:lstStyle>
+            <a:lvl1pPr marL="0" indent="0" algn="ctr" defTabSz="914400" rtl="0" eaLnBrk="1" latinLnBrk="0" hangingPunct="1">
+              <a:lnSpc>
+                <a:spcPct val="90000"/>
+              </a:lnSpc>
+              <a:spcBef>
+                <a:spcPts val="1000"/>
+              </a:spcBef>
+              <a:buFont typeface="Arial" panose="020B0604020202020204" pitchFamily="34" charset="0"/>
+              <a:buNone/>
+              <a:defRPr sz="2400" kern="1200">
+                <a:solidFill>
+                  <a:schemeClr val="tx1"/>
+                </a:solidFill>
+                <a:latin typeface="+mn-lt"/>
+                <a:ea typeface="+mn-ea"/>
+                <a:cs typeface="+mn-cs"/>
+              </a:defRPr>
+            </a:lvl1pPr>
+            <a:lvl2pPr marL="457200" indent="0" algn="ctr" defTabSz="914400" rtl="0" eaLnBrk="1" latinLnBrk="0" hangingPunct="1">
+              <a:lnSpc>
+                <a:spcPct val="90000"/>
+              </a:lnSpc>
+              <a:spcBef>
+                <a:spcPts val="500"/>
+              </a:spcBef>
+              <a:buFont typeface="Arial" panose="020B0604020202020204" pitchFamily="34" charset="0"/>
+              <a:buNone/>
+              <a:defRPr sz="2000" kern="1200">
+                <a:solidFill>
+                  <a:schemeClr val="tx1"/>
+                </a:solidFill>
+                <a:latin typeface="+mn-lt"/>
+                <a:ea typeface="+mn-ea"/>
+                <a:cs typeface="+mn-cs"/>
+              </a:defRPr>
+            </a:lvl2pPr>
+            <a:lvl3pPr marL="914400" indent="0" algn="ctr" defTabSz="914400" rtl="0" eaLnBrk="1" latinLnBrk="0" hangingPunct="1">
+              <a:lnSpc>
+                <a:spcPct val="90000"/>
+              </a:lnSpc>
+              <a:spcBef>
+                <a:spcPts val="500"/>
+              </a:spcBef>
+              <a:buFont typeface="Arial" panose="020B0604020202020204" pitchFamily="34" charset="0"/>
+              <a:buNone/>
+              <a:defRPr sz="1800" kern="1200">
+                <a:solidFill>
+                  <a:schemeClr val="tx1"/>
+                </a:solidFill>
+                <a:latin typeface="+mn-lt"/>
+                <a:ea typeface="+mn-ea"/>
+                <a:cs typeface="+mn-cs"/>
+              </a:defRPr>
+            </a:lvl3pPr>
+            <a:lvl4pPr marL="1371600" indent="0" algn="ctr" defTabSz="914400" rtl="0" eaLnBrk="1" latinLnBrk="0" hangingPunct="1">
+              <a:lnSpc>
+                <a:spcPct val="90000"/>
+              </a:lnSpc>
+              <a:spcBef>
+                <a:spcPts val="500"/>
+              </a:spcBef>
+              <a:buFont typeface="Arial" panose="020B0604020202020204" pitchFamily="34" charset="0"/>
+              <a:buNone/>
+              <a:defRPr sz="1600" kern="1200">
+                <a:solidFill>
+                  <a:schemeClr val="tx1"/>
+                </a:solidFill>
+                <a:latin typeface="+mn-lt"/>
+                <a:ea typeface="+mn-ea"/>
+                <a:cs typeface="+mn-cs"/>
+              </a:defRPr>
+            </a:lvl4pPr>
+            <a:lvl5pPr marL="1828800" indent="0" algn="ctr" defTabSz="914400" rtl="0" eaLnBrk="1" latinLnBrk="0" hangingPunct="1">
+              <a:lnSpc>
+                <a:spcPct val="90000"/>
+              </a:lnSpc>
+              <a:spcBef>
+                <a:spcPts val="500"/>
+              </a:spcBef>
+              <a:buFont typeface="Arial" panose="020B0604020202020204" pitchFamily="34" charset="0"/>
+              <a:buNone/>
+              <a:defRPr sz="1600" kern="1200">
+                <a:solidFill>
+                  <a:schemeClr val="tx1"/>
+                </a:solidFill>
+                <a:latin typeface="+mn-lt"/>
+                <a:ea typeface="+mn-ea"/>
+                <a:cs typeface="+mn-cs"/>
+              </a:defRPr>
+            </a:lvl5pPr>
+            <a:lvl6pPr marL="2286000" indent="0" algn="ctr" defTabSz="914400" rtl="0" eaLnBrk="1" latinLnBrk="0" hangingPunct="1">
+              <a:lnSpc>
+                <a:spcPct val="90000"/>
+              </a:lnSpc>
+              <a:spcBef>
+                <a:spcPts val="500"/>
+              </a:spcBef>
+              <a:buFont typeface="Arial" panose="020B0604020202020204" pitchFamily="34" charset="0"/>
+              <a:buNone/>
+              <a:defRPr sz="1600" kern="1200">
+                <a:solidFill>
+                  <a:schemeClr val="tx1"/>
+                </a:solidFill>
+                <a:latin typeface="+mn-lt"/>
+                <a:ea typeface="+mn-ea"/>
+                <a:cs typeface="+mn-cs"/>
+              </a:defRPr>
+            </a:lvl6pPr>
+            <a:lvl7pPr marL="2743200" indent="0" algn="ctr" defTabSz="914400" rtl="0" eaLnBrk="1" latinLnBrk="0" hangingPunct="1">
+              <a:lnSpc>
+                <a:spcPct val="90000"/>
+              </a:lnSpc>
+              <a:spcBef>
+                <a:spcPts val="500"/>
+              </a:spcBef>
+              <a:buFont typeface="Arial" panose="020B0604020202020204" pitchFamily="34" charset="0"/>
+              <a:buNone/>
+              <a:defRPr sz="1600" kern="1200">
+                <a:solidFill>
+                  <a:schemeClr val="tx1"/>
+                </a:solidFill>
+                <a:latin typeface="+mn-lt"/>
+                <a:ea typeface="+mn-ea"/>
+                <a:cs typeface="+mn-cs"/>
+              </a:defRPr>
+            </a:lvl7pPr>
+            <a:lvl8pPr marL="3200400" indent="0" algn="ctr" defTabSz="914400" rtl="0" eaLnBrk="1" latinLnBrk="0" hangingPunct="1">
+              <a:lnSpc>
+                <a:spcPct val="90000"/>
+              </a:lnSpc>
+              <a:spcBef>
+                <a:spcPts val="500"/>
+              </a:spcBef>
+              <a:buFont typeface="Arial" panose="020B0604020202020204" pitchFamily="34" charset="0"/>
+              <a:buNone/>
+              <a:defRPr sz="1600" kern="1200">
+                <a:solidFill>
+                  <a:schemeClr val="tx1"/>
+                </a:solidFill>
+                <a:latin typeface="+mn-lt"/>
+                <a:ea typeface="+mn-ea"/>
+                <a:cs typeface="+mn-cs"/>
+              </a:defRPr>
+            </a:lvl8pPr>
+            <a:lvl9pPr marL="3657600" indent="0" algn="ctr" defTabSz="914400" rtl="0" eaLnBrk="1" latinLnBrk="0" hangingPunct="1">
+              <a:lnSpc>
+                <a:spcPct val="90000"/>
+              </a:lnSpc>
+              <a:spcBef>
+                <a:spcPts val="500"/>
+              </a:spcBef>
+              <a:buFont typeface="Arial" panose="020B0604020202020204" pitchFamily="34" charset="0"/>
+              <a:buNone/>
+              <a:defRPr sz="1600" kern="1200">
+                <a:solidFill>
+                  <a:schemeClr val="tx1"/>
+                </a:solidFill>
+                <a:latin typeface="+mn-lt"/>
+                <a:ea typeface="+mn-ea"/>
+                <a:cs typeface="+mn-cs"/>
+              </a:defRPr>
+            </a:lvl9pPr>
+          </a:lstStyle>
+          <a:p>
+            <a:endParaRPr lang="en-GB" sz="1400" dirty="0" smtClean="0">
+              <a:latin typeface="Brush King" panose="02000600000000000000" pitchFamily="50" charset="0"/>
+            </a:endParaRPr>
+          </a:p>
+          <a:p>
+            <a:r>
+              <a:rPr lang="en-GB" sz="1050" dirty="0" smtClean="0">
+                <a:latin typeface="Brush King" panose="02000600000000000000" pitchFamily="50" charset="0"/>
+              </a:rPr>
+              <a:t>brought </a:t>
+            </a:r>
+            <a:r>
+              <a:rPr lang="en-GB" sz="1050" dirty="0" smtClean="0">
+                <a:latin typeface="Brush King" panose="02000600000000000000" pitchFamily="50" charset="0"/>
+              </a:rPr>
+              <a:t>to you by the BDM lab</a:t>
+            </a:r>
+            <a:endParaRPr lang="en-GB" sz="1050" dirty="0">
+              <a:latin typeface="Brush King" panose="02000600000000000000" pitchFamily="50" charset="0"/>
+            </a:endParaRPr>
+          </a:p>
+        </p:txBody>
+      </p:sp>
+    </p:spTree>
+    <p:extLst>
+      <p:ext uri="{BB962C8B-B14F-4D97-AF65-F5344CB8AC3E}">
+        <p14:creationId xmlns:p14="http://schemas.microsoft.com/office/powerpoint/2010/main" val="3326736099"/>
       </p:ext>
     </p:extLst>
   </p:cSld>

</xml_diff>

<commit_message>
20% increase + pure skill vs semi skill
</commit_message>
<xml_diff>
--- a/images/Whack a mole.pptx
+++ b/images/Whack a mole.pptx
@@ -204,7 +204,7 @@
           <a:p>
             <a:fld id="{F8124032-DB74-4B24-9D6C-0DB73E286C2C}" type="datetimeFigureOut">
               <a:rPr lang="en-GB" smtClean="0"/>
-              <a:t>01/05/2021</a:t>
+              <a:t>24/06/2021</a:t>
             </a:fld>
             <a:endParaRPr lang="en-GB"/>
           </a:p>
@@ -945,7 +945,7 @@
           <a:p>
             <a:fld id="{AD5A3EC8-63D0-49CB-ABB2-40C0A298F0AD}" type="datetimeFigureOut">
               <a:rPr lang="en-GB" smtClean="0"/>
-              <a:t>01/05/2021</a:t>
+              <a:t>24/06/2021</a:t>
             </a:fld>
             <a:endParaRPr lang="en-GB"/>
           </a:p>
@@ -1115,7 +1115,7 @@
           <a:p>
             <a:fld id="{AD5A3EC8-63D0-49CB-ABB2-40C0A298F0AD}" type="datetimeFigureOut">
               <a:rPr lang="en-GB" smtClean="0"/>
-              <a:t>01/05/2021</a:t>
+              <a:t>24/06/2021</a:t>
             </a:fld>
             <a:endParaRPr lang="en-GB"/>
           </a:p>
@@ -1295,7 +1295,7 @@
           <a:p>
             <a:fld id="{AD5A3EC8-63D0-49CB-ABB2-40C0A298F0AD}" type="datetimeFigureOut">
               <a:rPr lang="en-GB" smtClean="0"/>
-              <a:t>01/05/2021</a:t>
+              <a:t>24/06/2021</a:t>
             </a:fld>
             <a:endParaRPr lang="en-GB"/>
           </a:p>
@@ -1465,7 +1465,7 @@
           <a:p>
             <a:fld id="{AD5A3EC8-63D0-49CB-ABB2-40C0A298F0AD}" type="datetimeFigureOut">
               <a:rPr lang="en-GB" smtClean="0"/>
-              <a:t>01/05/2021</a:t>
+              <a:t>24/06/2021</a:t>
             </a:fld>
             <a:endParaRPr lang="en-GB"/>
           </a:p>
@@ -1711,7 +1711,7 @@
           <a:p>
             <a:fld id="{AD5A3EC8-63D0-49CB-ABB2-40C0A298F0AD}" type="datetimeFigureOut">
               <a:rPr lang="en-GB" smtClean="0"/>
-              <a:t>01/05/2021</a:t>
+              <a:t>24/06/2021</a:t>
             </a:fld>
             <a:endParaRPr lang="en-GB"/>
           </a:p>
@@ -1943,7 +1943,7 @@
           <a:p>
             <a:fld id="{AD5A3EC8-63D0-49CB-ABB2-40C0A298F0AD}" type="datetimeFigureOut">
               <a:rPr lang="en-GB" smtClean="0"/>
-              <a:t>01/05/2021</a:t>
+              <a:t>24/06/2021</a:t>
             </a:fld>
             <a:endParaRPr lang="en-GB"/>
           </a:p>
@@ -2310,7 +2310,7 @@
           <a:p>
             <a:fld id="{AD5A3EC8-63D0-49CB-ABB2-40C0A298F0AD}" type="datetimeFigureOut">
               <a:rPr lang="en-GB" smtClean="0"/>
-              <a:t>01/05/2021</a:t>
+              <a:t>24/06/2021</a:t>
             </a:fld>
             <a:endParaRPr lang="en-GB"/>
           </a:p>
@@ -2428,7 +2428,7 @@
           <a:p>
             <a:fld id="{AD5A3EC8-63D0-49CB-ABB2-40C0A298F0AD}" type="datetimeFigureOut">
               <a:rPr lang="en-GB" smtClean="0"/>
-              <a:t>01/05/2021</a:t>
+              <a:t>24/06/2021</a:t>
             </a:fld>
             <a:endParaRPr lang="en-GB"/>
           </a:p>
@@ -2523,7 +2523,7 @@
           <a:p>
             <a:fld id="{AD5A3EC8-63D0-49CB-ABB2-40C0A298F0AD}" type="datetimeFigureOut">
               <a:rPr lang="en-GB" smtClean="0"/>
-              <a:t>01/05/2021</a:t>
+              <a:t>24/06/2021</a:t>
             </a:fld>
             <a:endParaRPr lang="en-GB"/>
           </a:p>
@@ -2800,7 +2800,7 @@
           <a:p>
             <a:fld id="{AD5A3EC8-63D0-49CB-ABB2-40C0A298F0AD}" type="datetimeFigureOut">
               <a:rPr lang="en-GB" smtClean="0"/>
-              <a:t>01/05/2021</a:t>
+              <a:t>24/06/2021</a:t>
             </a:fld>
             <a:endParaRPr lang="en-GB"/>
           </a:p>
@@ -3053,7 +3053,7 @@
           <a:p>
             <a:fld id="{AD5A3EC8-63D0-49CB-ABB2-40C0A298F0AD}" type="datetimeFigureOut">
               <a:rPr lang="en-GB" smtClean="0"/>
-              <a:t>01/05/2021</a:t>
+              <a:t>24/06/2021</a:t>
             </a:fld>
             <a:endParaRPr lang="en-GB"/>
           </a:p>
@@ -3266,7 +3266,7 @@
           <a:p>
             <a:fld id="{AD5A3EC8-63D0-49CB-ABB2-40C0A298F0AD}" type="datetimeFigureOut">
               <a:rPr lang="en-GB" smtClean="0"/>
-              <a:t>01/05/2021</a:t>
+              <a:t>24/06/2021</a:t>
             </a:fld>
             <a:endParaRPr lang="en-GB"/>
           </a:p>
@@ -5520,6 +5520,78 @@
           </a:p>
         </p:txBody>
       </p:sp>
+      <p:pic>
+        <p:nvPicPr>
+          <p:cNvPr id="8" name="Picture 7" descr="Graphical user interface, application&#10;&#10;Description automatically generated with medium confidence">
+            <a:extLst>
+              <a:ext uri="{FF2B5EF4-FFF2-40B4-BE49-F238E27FC236}">
+                <a16:creationId xmlns:a16="http://schemas.microsoft.com/office/drawing/2014/main" id="{696C9769-6826-4D34-9141-9D815713AAF4}"/>
+              </a:ext>
+            </a:extLst>
+          </p:cNvPr>
+          <p:cNvPicPr>
+            <a:picLocks noChangeAspect="1"/>
+          </p:cNvPicPr>
+          <p:nvPr/>
+        </p:nvPicPr>
+        <p:blipFill>
+          <a:blip r:embed="rId4">
+            <a:extLst>
+              <a:ext uri="{28A0092B-C50C-407E-A947-70E740481C1C}">
+                <a14:useLocalDpi xmlns:a14="http://schemas.microsoft.com/office/drawing/2010/main" val="0"/>
+              </a:ext>
+            </a:extLst>
+          </a:blip>
+          <a:stretch>
+            <a:fillRect/>
+          </a:stretch>
+        </p:blipFill>
+        <p:spPr>
+          <a:xfrm>
+            <a:off x="-12782" y="-1"/>
+            <a:ext cx="11237922" cy="5220000"/>
+          </a:xfrm>
+          <a:prstGeom prst="rect">
+            <a:avLst/>
+          </a:prstGeom>
+        </p:spPr>
+      </p:pic>
+      <p:pic>
+        <p:nvPicPr>
+          <p:cNvPr id="10" name="Picture 9" descr="A picture containing text&#10;&#10;Description automatically generated">
+            <a:extLst>
+              <a:ext uri="{FF2B5EF4-FFF2-40B4-BE49-F238E27FC236}">
+                <a16:creationId xmlns:a16="http://schemas.microsoft.com/office/drawing/2014/main" id="{13479E2E-BEEB-4041-B73A-574DE24A7BDE}"/>
+              </a:ext>
+            </a:extLst>
+          </p:cNvPr>
+          <p:cNvPicPr>
+            <a:picLocks noChangeAspect="1"/>
+          </p:cNvPicPr>
+          <p:nvPr/>
+        </p:nvPicPr>
+        <p:blipFill>
+          <a:blip r:embed="rId5">
+            <a:extLst>
+              <a:ext uri="{28A0092B-C50C-407E-A947-70E740481C1C}">
+                <a14:useLocalDpi xmlns:a14="http://schemas.microsoft.com/office/drawing/2010/main" val="0"/>
+              </a:ext>
+            </a:extLst>
+          </a:blip>
+          <a:stretch>
+            <a:fillRect/>
+          </a:stretch>
+        </p:blipFill>
+        <p:spPr>
+          <a:xfrm>
+            <a:off x="-3225805" y="6446719"/>
+            <a:ext cx="15588000" cy="1948500"/>
+          </a:xfrm>
+          <a:prstGeom prst="rect">
+            <a:avLst/>
+          </a:prstGeom>
+        </p:spPr>
+      </p:pic>
     </p:spTree>
     <p:extLst>
       <p:ext uri="{BB962C8B-B14F-4D97-AF65-F5344CB8AC3E}">

</xml_diff>